<commit_message>
Edit documentation and presentation.
</commit_message>
<xml_diff>
--- a/Documents/Presentation.pptx
+++ b/Documents/Presentation.pptx
@@ -6,8 +6,8 @@
   </p:sldMasterIdLst>
   <p:sldIdLst>
     <p:sldId id="256" r:id="rId2"/>
-    <p:sldId id="257" r:id="rId3"/>
-    <p:sldId id="258" r:id="rId4"/>
+    <p:sldId id="258" r:id="rId3"/>
+    <p:sldId id="257" r:id="rId4"/>
     <p:sldId id="259" r:id="rId5"/>
     <p:sldId id="260" r:id="rId6"/>
   </p:sldIdLst>
@@ -317,7 +317,7 @@
             <a:fld id="{1D8BD707-D9CF-40AE-B4C6-C98DA3205C09}" type="datetimeFigureOut">
               <a:rPr lang="en-US" smtClean="0"/>
               <a:pPr/>
-              <a:t>2/7/2025</a:t>
+              <a:t>2/8/2025</a:t>
             </a:fld>
             <a:endParaRPr lang="en-US"/>
           </a:p>
@@ -482,7 +482,7 @@
             <a:fld id="{1D8BD707-D9CF-40AE-B4C6-C98DA3205C09}" type="datetimeFigureOut">
               <a:rPr lang="en-US" smtClean="0"/>
               <a:pPr/>
-              <a:t>2/7/2025</a:t>
+              <a:t>2/8/2025</a:t>
             </a:fld>
             <a:endParaRPr lang="en-US"/>
           </a:p>
@@ -657,7 +657,7 @@
             <a:fld id="{1D8BD707-D9CF-40AE-B4C6-C98DA3205C09}" type="datetimeFigureOut">
               <a:rPr lang="en-US" smtClean="0"/>
               <a:pPr/>
-              <a:t>2/7/2025</a:t>
+              <a:t>2/8/2025</a:t>
             </a:fld>
             <a:endParaRPr lang="en-US"/>
           </a:p>
@@ -822,7 +822,7 @@
             <a:fld id="{1D8BD707-D9CF-40AE-B4C6-C98DA3205C09}" type="datetimeFigureOut">
               <a:rPr lang="en-US" smtClean="0"/>
               <a:pPr/>
-              <a:t>2/7/2025</a:t>
+              <a:t>2/8/2025</a:t>
             </a:fld>
             <a:endParaRPr lang="en-US"/>
           </a:p>
@@ -1064,7 +1064,7 @@
             <a:fld id="{1D8BD707-D9CF-40AE-B4C6-C98DA3205C09}" type="datetimeFigureOut">
               <a:rPr lang="en-US" smtClean="0"/>
               <a:pPr/>
-              <a:t>2/7/2025</a:t>
+              <a:t>2/8/2025</a:t>
             </a:fld>
             <a:endParaRPr lang="en-US"/>
           </a:p>
@@ -1346,7 +1346,7 @@
             <a:fld id="{1D8BD707-D9CF-40AE-B4C6-C98DA3205C09}" type="datetimeFigureOut">
               <a:rPr lang="en-US" smtClean="0"/>
               <a:pPr/>
-              <a:t>2/7/2025</a:t>
+              <a:t>2/8/2025</a:t>
             </a:fld>
             <a:endParaRPr lang="en-US"/>
           </a:p>
@@ -1762,7 +1762,7 @@
             <a:fld id="{1D8BD707-D9CF-40AE-B4C6-C98DA3205C09}" type="datetimeFigureOut">
               <a:rPr lang="en-US" smtClean="0"/>
               <a:pPr/>
-              <a:t>2/7/2025</a:t>
+              <a:t>2/8/2025</a:t>
             </a:fld>
             <a:endParaRPr lang="en-US"/>
           </a:p>
@@ -1876,7 +1876,7 @@
             <a:fld id="{1D8BD707-D9CF-40AE-B4C6-C98DA3205C09}" type="datetimeFigureOut">
               <a:rPr lang="en-US" smtClean="0"/>
               <a:pPr/>
-              <a:t>2/7/2025</a:t>
+              <a:t>2/8/2025</a:t>
             </a:fld>
             <a:endParaRPr lang="en-US"/>
           </a:p>
@@ -1968,7 +1968,7 @@
             <a:fld id="{1D8BD707-D9CF-40AE-B4C6-C98DA3205C09}" type="datetimeFigureOut">
               <a:rPr lang="en-US" smtClean="0"/>
               <a:pPr/>
-              <a:t>2/7/2025</a:t>
+              <a:t>2/8/2025</a:t>
             </a:fld>
             <a:endParaRPr lang="en-US"/>
           </a:p>
@@ -2240,7 +2240,7 @@
             <a:fld id="{1D8BD707-D9CF-40AE-B4C6-C98DA3205C09}" type="datetimeFigureOut">
               <a:rPr lang="en-US" smtClean="0"/>
               <a:pPr/>
-              <a:t>2/7/2025</a:t>
+              <a:t>2/8/2025</a:t>
             </a:fld>
             <a:endParaRPr lang="en-US"/>
           </a:p>
@@ -2489,7 +2489,7 @@
             <a:fld id="{1D8BD707-D9CF-40AE-B4C6-C98DA3205C09}" type="datetimeFigureOut">
               <a:rPr lang="en-US" smtClean="0"/>
               <a:pPr/>
-              <a:t>2/7/2025</a:t>
+              <a:t>2/8/2025</a:t>
             </a:fld>
             <a:endParaRPr lang="en-US"/>
           </a:p>
@@ -2697,7 +2697,7 @@
             <a:fld id="{1D8BD707-D9CF-40AE-B4C6-C98DA3205C09}" type="datetimeFigureOut">
               <a:rPr lang="en-US" smtClean="0"/>
               <a:pPr/>
-              <a:t>2/7/2025</a:t>
+              <a:t>2/8/2025</a:t>
             </a:fld>
             <a:endParaRPr lang="en-US"/>
           </a:p>
@@ -3216,723 +3216,6 @@
     <p:bg>
       <p:bgPr>
         <a:solidFill>
-          <a:srgbClr val="FFFCF7"/>
-        </a:solidFill>
-        <a:effectLst/>
-      </p:bgPr>
-    </p:bg>
-    <p:spTree>
-      <p:nvGrpSpPr>
-        <p:cNvPr id="1" name=""/>
-        <p:cNvGrpSpPr/>
-        <p:nvPr/>
-      </p:nvGrpSpPr>
-      <p:grpSpPr>
-        <a:xfrm>
-          <a:off x="0" y="0"/>
-          <a:ext cx="0" cy="0"/>
-          <a:chOff x="0" y="0"/>
-          <a:chExt cx="0" cy="0"/>
-        </a:xfrm>
-      </p:grpSpPr>
-      <p:sp>
-        <p:nvSpPr>
-          <p:cNvPr id="2" name="Freeform 2"/>
-          <p:cNvSpPr/>
-          <p:nvPr/>
-        </p:nvSpPr>
-        <p:spPr>
-          <a:xfrm>
-            <a:off x="9465034" y="878304"/>
-            <a:ext cx="1797669" cy="1851531"/>
-          </a:xfrm>
-          <a:custGeom>
-            <a:avLst/>
-            <a:gdLst/>
-            <a:ahLst/>
-            <a:cxnLst/>
-            <a:rect l="l" t="t" r="r" b="b"/>
-            <a:pathLst>
-              <a:path w="1797669" h="1851531">
-                <a:moveTo>
-                  <a:pt x="0" y="0"/>
-                </a:moveTo>
-                <a:lnTo>
-                  <a:pt x="1797669" y="0"/>
-                </a:lnTo>
-                <a:lnTo>
-                  <a:pt x="1797669" y="1851531"/>
-                </a:lnTo>
-                <a:lnTo>
-                  <a:pt x="0" y="1851531"/>
-                </a:lnTo>
-                <a:lnTo>
-                  <a:pt x="0" y="0"/>
-                </a:lnTo>
-                <a:close/>
-              </a:path>
-            </a:pathLst>
-          </a:custGeom>
-          <a:blipFill>
-            <a:blip r:embed="rId2">
-              <a:extLst>
-                <a:ext uri="{96DAC541-7B7A-43D3-8B79-37D633B846F1}">
-                  <asvg:svgBlip xmlns:asvg="http://schemas.microsoft.com/office/drawing/2016/SVG/main" r:embed="rId3"/>
-                </a:ext>
-              </a:extLst>
-            </a:blip>
-            <a:stretch>
-              <a:fillRect/>
-            </a:stretch>
-          </a:blipFill>
-        </p:spPr>
-      </p:sp>
-      <p:sp>
-        <p:nvSpPr>
-          <p:cNvPr id="3" name="Freeform 3"/>
-          <p:cNvSpPr/>
-          <p:nvPr/>
-        </p:nvSpPr>
-        <p:spPr>
-          <a:xfrm>
-            <a:off x="9401760" y="5288968"/>
-            <a:ext cx="1924218" cy="1798269"/>
-          </a:xfrm>
-          <a:custGeom>
-            <a:avLst/>
-            <a:gdLst/>
-            <a:ahLst/>
-            <a:cxnLst/>
-            <a:rect l="l" t="t" r="r" b="b"/>
-            <a:pathLst>
-              <a:path w="1924218" h="1798269">
-                <a:moveTo>
-                  <a:pt x="0" y="0"/>
-                </a:moveTo>
-                <a:lnTo>
-                  <a:pt x="1924218" y="0"/>
-                </a:lnTo>
-                <a:lnTo>
-                  <a:pt x="1924218" y="1798269"/>
-                </a:lnTo>
-                <a:lnTo>
-                  <a:pt x="0" y="1798269"/>
-                </a:lnTo>
-                <a:lnTo>
-                  <a:pt x="0" y="0"/>
-                </a:lnTo>
-                <a:close/>
-              </a:path>
-            </a:pathLst>
-          </a:custGeom>
-          <a:blipFill>
-            <a:blip r:embed="rId4">
-              <a:extLst>
-                <a:ext uri="{96DAC541-7B7A-43D3-8B79-37D633B846F1}">
-                  <asvg:svgBlip xmlns:asvg="http://schemas.microsoft.com/office/drawing/2016/SVG/main" r:embed="rId5"/>
-                </a:ext>
-              </a:extLst>
-            </a:blip>
-            <a:stretch>
-              <a:fillRect/>
-            </a:stretch>
-          </a:blipFill>
-        </p:spPr>
-      </p:sp>
-      <p:sp>
-        <p:nvSpPr>
-          <p:cNvPr id="4" name="Freeform 4"/>
-          <p:cNvSpPr/>
-          <p:nvPr/>
-        </p:nvSpPr>
-        <p:spPr>
-          <a:xfrm>
-            <a:off x="9959926" y="5862185"/>
-            <a:ext cx="807886" cy="656591"/>
-          </a:xfrm>
-          <a:custGeom>
-            <a:avLst/>
-            <a:gdLst/>
-            <a:ahLst/>
-            <a:cxnLst/>
-            <a:rect l="l" t="t" r="r" b="b"/>
-            <a:pathLst>
-              <a:path w="807886" h="656591">
-                <a:moveTo>
-                  <a:pt x="0" y="0"/>
-                </a:moveTo>
-                <a:lnTo>
-                  <a:pt x="807886" y="0"/>
-                </a:lnTo>
-                <a:lnTo>
-                  <a:pt x="807886" y="656590"/>
-                </a:lnTo>
-                <a:lnTo>
-                  <a:pt x="0" y="656590"/>
-                </a:lnTo>
-                <a:lnTo>
-                  <a:pt x="0" y="0"/>
-                </a:lnTo>
-                <a:close/>
-              </a:path>
-            </a:pathLst>
-          </a:custGeom>
-          <a:blipFill>
-            <a:blip r:embed="rId6">
-              <a:extLst>
-                <a:ext uri="{96DAC541-7B7A-43D3-8B79-37D633B846F1}">
-                  <asvg:svgBlip xmlns:asvg="http://schemas.microsoft.com/office/drawing/2016/SVG/main" r:embed="rId7"/>
-                </a:ext>
-              </a:extLst>
-            </a:blip>
-            <a:stretch>
-              <a:fillRect/>
-            </a:stretch>
-          </a:blipFill>
-        </p:spPr>
-      </p:sp>
-      <p:sp>
-        <p:nvSpPr>
-          <p:cNvPr id="5" name="Freeform 5"/>
-          <p:cNvSpPr/>
-          <p:nvPr/>
-        </p:nvSpPr>
-        <p:spPr>
-          <a:xfrm>
-            <a:off x="10106465" y="1522907"/>
-            <a:ext cx="661347" cy="661347"/>
-          </a:xfrm>
-          <a:custGeom>
-            <a:avLst/>
-            <a:gdLst/>
-            <a:ahLst/>
-            <a:cxnLst/>
-            <a:rect l="l" t="t" r="r" b="b"/>
-            <a:pathLst>
-              <a:path w="661347" h="661347">
-                <a:moveTo>
-                  <a:pt x="0" y="0"/>
-                </a:moveTo>
-                <a:lnTo>
-                  <a:pt x="661347" y="0"/>
-                </a:lnTo>
-                <a:lnTo>
-                  <a:pt x="661347" y="661346"/>
-                </a:lnTo>
-                <a:lnTo>
-                  <a:pt x="0" y="661346"/>
-                </a:lnTo>
-                <a:lnTo>
-                  <a:pt x="0" y="0"/>
-                </a:lnTo>
-                <a:close/>
-              </a:path>
-            </a:pathLst>
-          </a:custGeom>
-          <a:blipFill>
-            <a:blip r:embed="rId8">
-              <a:extLst>
-                <a:ext uri="{96DAC541-7B7A-43D3-8B79-37D633B846F1}">
-                  <asvg:svgBlip xmlns:asvg="http://schemas.microsoft.com/office/drawing/2016/SVG/main" r:embed="rId9"/>
-                </a:ext>
-              </a:extLst>
-            </a:blip>
-            <a:stretch>
-              <a:fillRect/>
-            </a:stretch>
-          </a:blipFill>
-        </p:spPr>
-      </p:sp>
-      <p:sp>
-        <p:nvSpPr>
-          <p:cNvPr id="6" name="Freeform 6"/>
-          <p:cNvSpPr/>
-          <p:nvPr/>
-        </p:nvSpPr>
-        <p:spPr>
-          <a:xfrm>
-            <a:off x="14036620" y="931567"/>
-            <a:ext cx="1924218" cy="1798269"/>
-          </a:xfrm>
-          <a:custGeom>
-            <a:avLst/>
-            <a:gdLst/>
-            <a:ahLst/>
-            <a:cxnLst/>
-            <a:rect l="l" t="t" r="r" b="b"/>
-            <a:pathLst>
-              <a:path w="1924218" h="1798269">
-                <a:moveTo>
-                  <a:pt x="0" y="0"/>
-                </a:moveTo>
-                <a:lnTo>
-                  <a:pt x="1924217" y="0"/>
-                </a:lnTo>
-                <a:lnTo>
-                  <a:pt x="1924217" y="1798268"/>
-                </a:lnTo>
-                <a:lnTo>
-                  <a:pt x="0" y="1798268"/>
-                </a:lnTo>
-                <a:lnTo>
-                  <a:pt x="0" y="0"/>
-                </a:lnTo>
-                <a:close/>
-              </a:path>
-            </a:pathLst>
-          </a:custGeom>
-          <a:blipFill>
-            <a:blip r:embed="rId10">
-              <a:extLst>
-                <a:ext uri="{96DAC541-7B7A-43D3-8B79-37D633B846F1}">
-                  <asvg:svgBlip xmlns:asvg="http://schemas.microsoft.com/office/drawing/2016/SVG/main" r:embed="rId11"/>
-                </a:ext>
-              </a:extLst>
-            </a:blip>
-            <a:stretch>
-              <a:fillRect/>
-            </a:stretch>
-          </a:blipFill>
-        </p:spPr>
-      </p:sp>
-      <p:sp>
-        <p:nvSpPr>
-          <p:cNvPr id="7" name="Freeform 7"/>
-          <p:cNvSpPr/>
-          <p:nvPr/>
-        </p:nvSpPr>
-        <p:spPr>
-          <a:xfrm>
-            <a:off x="14740868" y="1522907"/>
-            <a:ext cx="515722" cy="656591"/>
-          </a:xfrm>
-          <a:custGeom>
-            <a:avLst/>
-            <a:gdLst/>
-            <a:ahLst/>
-            <a:cxnLst/>
-            <a:rect l="l" t="t" r="r" b="b"/>
-            <a:pathLst>
-              <a:path w="515722" h="656591">
-                <a:moveTo>
-                  <a:pt x="0" y="0"/>
-                </a:moveTo>
-                <a:lnTo>
-                  <a:pt x="515722" y="0"/>
-                </a:lnTo>
-                <a:lnTo>
-                  <a:pt x="515722" y="656590"/>
-                </a:lnTo>
-                <a:lnTo>
-                  <a:pt x="0" y="656590"/>
-                </a:lnTo>
-                <a:lnTo>
-                  <a:pt x="0" y="0"/>
-                </a:lnTo>
-                <a:close/>
-              </a:path>
-            </a:pathLst>
-          </a:custGeom>
-          <a:blipFill>
-            <a:blip r:embed="rId12">
-              <a:extLst>
-                <a:ext uri="{96DAC541-7B7A-43D3-8B79-37D633B846F1}">
-                  <asvg:svgBlip xmlns:asvg="http://schemas.microsoft.com/office/drawing/2016/SVG/main" r:embed="rId13"/>
-                </a:ext>
-              </a:extLst>
-            </a:blip>
-            <a:stretch>
-              <a:fillRect/>
-            </a:stretch>
-          </a:blipFill>
-        </p:spPr>
-      </p:sp>
-      <p:sp>
-        <p:nvSpPr>
-          <p:cNvPr id="8" name="Freeform 8"/>
-          <p:cNvSpPr/>
-          <p:nvPr/>
-        </p:nvSpPr>
-        <p:spPr>
-          <a:xfrm>
-            <a:off x="14099894" y="5235705"/>
-            <a:ext cx="1797669" cy="1851531"/>
-          </a:xfrm>
-          <a:custGeom>
-            <a:avLst/>
-            <a:gdLst/>
-            <a:ahLst/>
-            <a:cxnLst/>
-            <a:rect l="l" t="t" r="r" b="b"/>
-            <a:pathLst>
-              <a:path w="1797669" h="1851531">
-                <a:moveTo>
-                  <a:pt x="0" y="0"/>
-                </a:moveTo>
-                <a:lnTo>
-                  <a:pt x="1797669" y="0"/>
-                </a:lnTo>
-                <a:lnTo>
-                  <a:pt x="1797669" y="1851532"/>
-                </a:lnTo>
-                <a:lnTo>
-                  <a:pt x="0" y="1851532"/>
-                </a:lnTo>
-                <a:lnTo>
-                  <a:pt x="0" y="0"/>
-                </a:lnTo>
-                <a:close/>
-              </a:path>
-            </a:pathLst>
-          </a:custGeom>
-          <a:blipFill>
-            <a:blip r:embed="rId14">
-              <a:extLst>
-                <a:ext uri="{96DAC541-7B7A-43D3-8B79-37D633B846F1}">
-                  <asvg:svgBlip xmlns:asvg="http://schemas.microsoft.com/office/drawing/2016/SVG/main" r:embed="rId15"/>
-                </a:ext>
-              </a:extLst>
-            </a:blip>
-            <a:stretch>
-              <a:fillRect/>
-            </a:stretch>
-          </a:blipFill>
-        </p:spPr>
-      </p:sp>
-      <p:sp>
-        <p:nvSpPr>
-          <p:cNvPr id="9" name="Freeform 9"/>
-          <p:cNvSpPr/>
-          <p:nvPr/>
-        </p:nvSpPr>
-        <p:spPr>
-          <a:xfrm>
-            <a:off x="14624236" y="5651378"/>
-            <a:ext cx="748986" cy="1020185"/>
-          </a:xfrm>
-          <a:custGeom>
-            <a:avLst/>
-            <a:gdLst/>
-            <a:ahLst/>
-            <a:cxnLst/>
-            <a:rect l="l" t="t" r="r" b="b"/>
-            <a:pathLst>
-              <a:path w="748986" h="1020185">
-                <a:moveTo>
-                  <a:pt x="0" y="0"/>
-                </a:moveTo>
-                <a:lnTo>
-                  <a:pt x="748986" y="0"/>
-                </a:lnTo>
-                <a:lnTo>
-                  <a:pt x="748986" y="1020185"/>
-                </a:lnTo>
-                <a:lnTo>
-                  <a:pt x="0" y="1020185"/>
-                </a:lnTo>
-                <a:lnTo>
-                  <a:pt x="0" y="0"/>
-                </a:lnTo>
-                <a:close/>
-              </a:path>
-            </a:pathLst>
-          </a:custGeom>
-          <a:blipFill>
-            <a:blip r:embed="rId16">
-              <a:extLst>
-                <a:ext uri="{96DAC541-7B7A-43D3-8B79-37D633B846F1}">
-                  <asvg:svgBlip xmlns:asvg="http://schemas.microsoft.com/office/drawing/2016/SVG/main" r:embed="rId17"/>
-                </a:ext>
-              </a:extLst>
-            </a:blip>
-            <a:stretch>
-              <a:fillRect/>
-            </a:stretch>
-          </a:blipFill>
-        </p:spPr>
-      </p:sp>
-      <p:sp>
-        <p:nvSpPr>
-          <p:cNvPr id="10" name="TextBox 10"/>
-          <p:cNvSpPr txBox="1"/>
-          <p:nvPr/>
-        </p:nvSpPr>
-        <p:spPr>
-          <a:xfrm>
-            <a:off x="1403053" y="3883052"/>
-            <a:ext cx="5501342" cy="2305050"/>
-          </a:xfrm>
-          <a:prstGeom prst="rect">
-            <a:avLst/>
-          </a:prstGeom>
-        </p:spPr>
-        <p:txBody>
-          <a:bodyPr lIns="0" tIns="0" rIns="0" bIns="0" rtlCol="0" anchor="t">
-            <a:spAutoFit/>
-          </a:bodyPr>
-          <a:lstStyle/>
-          <a:p>
-            <a:pPr marL="0" lvl="0" indent="0" algn="ctr">
-              <a:lnSpc>
-                <a:spcPts val="8399"/>
-              </a:lnSpc>
-              <a:spcBef>
-                <a:spcPct val="0"/>
-              </a:spcBef>
-            </a:pPr>
-            <a:r>
-              <a:rPr lang="en-US" sz="6999">
-                <a:solidFill>
-                  <a:srgbClr val="2B2B2B"/>
-                </a:solidFill>
-                <a:latin typeface="Agrandir"/>
-                <a:ea typeface="Agrandir"/>
-                <a:cs typeface="Agrandir"/>
-                <a:sym typeface="Agrandir"/>
-              </a:rPr>
-              <a:t>Stages of creation</a:t>
-            </a:r>
-          </a:p>
-        </p:txBody>
-      </p:sp>
-      <p:sp>
-        <p:nvSpPr>
-          <p:cNvPr id="11" name="TextBox 11"/>
-          <p:cNvSpPr txBox="1"/>
-          <p:nvPr/>
-        </p:nvSpPr>
-        <p:spPr>
-          <a:xfrm>
-            <a:off x="8704599" y="3122472"/>
-            <a:ext cx="3318539" cy="1043304"/>
-          </a:xfrm>
-          <a:prstGeom prst="rect">
-            <a:avLst/>
-          </a:prstGeom>
-        </p:spPr>
-        <p:txBody>
-          <a:bodyPr lIns="0" tIns="0" rIns="0" bIns="0" rtlCol="0" anchor="t">
-            <a:spAutoFit/>
-          </a:bodyPr>
-          <a:lstStyle/>
-          <a:p>
-            <a:pPr marL="0" lvl="0" indent="0" algn="ctr">
-              <a:lnSpc>
-                <a:spcPts val="3920"/>
-              </a:lnSpc>
-              <a:spcBef>
-                <a:spcPct val="0"/>
-              </a:spcBef>
-            </a:pPr>
-            <a:r>
-              <a:rPr lang="en-US" sz="2800">
-                <a:solidFill>
-                  <a:srgbClr val="2B2B2B"/>
-                </a:solidFill>
-                <a:latin typeface="Agrandir"/>
-                <a:ea typeface="Agrandir"/>
-                <a:cs typeface="Agrandir"/>
-                <a:sym typeface="Agrandir"/>
-              </a:rPr>
-              <a:t>Requirement Analysis</a:t>
-            </a:r>
-          </a:p>
-        </p:txBody>
-      </p:sp>
-      <p:grpSp>
-        <p:nvGrpSpPr>
-          <p:cNvPr id="12" name="Group 12"/>
-          <p:cNvGrpSpPr/>
-          <p:nvPr/>
-        </p:nvGrpSpPr>
-        <p:grpSpPr>
-          <a:xfrm>
-            <a:off x="8704599" y="7630330"/>
-            <a:ext cx="3318539" cy="1518069"/>
-            <a:chOff x="0" y="0"/>
-            <a:chExt cx="4424719" cy="2024092"/>
-          </a:xfrm>
-        </p:grpSpPr>
-        <p:sp>
-          <p:nvSpPr>
-            <p:cNvPr id="13" name="TextBox 13"/>
-            <p:cNvSpPr txBox="1"/>
-            <p:nvPr/>
-          </p:nvSpPr>
-          <p:spPr>
-            <a:xfrm>
-              <a:off x="0" y="-123825"/>
-              <a:ext cx="4424719" cy="1349798"/>
-            </a:xfrm>
-            <a:prstGeom prst="rect">
-              <a:avLst/>
-            </a:prstGeom>
-          </p:spPr>
-          <p:txBody>
-            <a:bodyPr lIns="0" tIns="0" rIns="0" bIns="0" rtlCol="0" anchor="t">
-              <a:spAutoFit/>
-            </a:bodyPr>
-            <a:lstStyle/>
-            <a:p>
-              <a:pPr marL="0" lvl="0" indent="0" algn="ctr">
-                <a:lnSpc>
-                  <a:spcPts val="3920"/>
-                </a:lnSpc>
-                <a:spcBef>
-                  <a:spcPct val="0"/>
-                </a:spcBef>
-              </a:pPr>
-              <a:r>
-                <a:rPr lang="en-US" sz="2800">
-                  <a:solidFill>
-                    <a:srgbClr val="2B2B2B"/>
-                  </a:solidFill>
-                  <a:latin typeface="Agrandir"/>
-                  <a:ea typeface="Agrandir"/>
-                  <a:cs typeface="Agrandir"/>
-                  <a:sym typeface="Agrandir"/>
-                </a:rPr>
-                <a:t>Designing the Structure</a:t>
-              </a:r>
-            </a:p>
-          </p:txBody>
-        </p:sp>
-        <p:sp>
-          <p:nvSpPr>
-            <p:cNvPr id="14" name="TextBox 14"/>
-            <p:cNvSpPr txBox="1"/>
-            <p:nvPr/>
-          </p:nvSpPr>
-          <p:spPr>
-            <a:xfrm>
-              <a:off x="0" y="1473125"/>
-              <a:ext cx="4424719" cy="550968"/>
-            </a:xfrm>
-            <a:prstGeom prst="rect">
-              <a:avLst/>
-            </a:prstGeom>
-          </p:spPr>
-          <p:txBody>
-            <a:bodyPr lIns="0" tIns="0" rIns="0" bIns="0" rtlCol="0" anchor="t">
-              <a:spAutoFit/>
-            </a:bodyPr>
-            <a:lstStyle/>
-            <a:p>
-              <a:pPr marL="0" lvl="0" indent="0" algn="ctr">
-                <a:lnSpc>
-                  <a:spcPts val="3080"/>
-                </a:lnSpc>
-              </a:pPr>
-              <a:endParaRPr/>
-            </a:p>
-          </p:txBody>
-        </p:sp>
-      </p:grpSp>
-      <p:sp>
-        <p:nvSpPr>
-          <p:cNvPr id="15" name="TextBox 15"/>
-          <p:cNvSpPr txBox="1"/>
-          <p:nvPr/>
-        </p:nvSpPr>
-        <p:spPr>
-          <a:xfrm>
-            <a:off x="13339459" y="3122472"/>
-            <a:ext cx="3318539" cy="1043304"/>
-          </a:xfrm>
-          <a:prstGeom prst="rect">
-            <a:avLst/>
-          </a:prstGeom>
-        </p:spPr>
-        <p:txBody>
-          <a:bodyPr lIns="0" tIns="0" rIns="0" bIns="0" rtlCol="0" anchor="t">
-            <a:spAutoFit/>
-          </a:bodyPr>
-          <a:lstStyle/>
-          <a:p>
-            <a:pPr marL="0" lvl="0" indent="0" algn="ctr">
-              <a:lnSpc>
-                <a:spcPts val="3920"/>
-              </a:lnSpc>
-              <a:spcBef>
-                <a:spcPct val="0"/>
-              </a:spcBef>
-            </a:pPr>
-            <a:r>
-              <a:rPr lang="en-US" sz="2800">
-                <a:solidFill>
-                  <a:srgbClr val="2B2B2B"/>
-                </a:solidFill>
-                <a:latin typeface="Agrandir"/>
-                <a:ea typeface="Agrandir"/>
-                <a:cs typeface="Agrandir"/>
-                <a:sym typeface="Agrandir"/>
-              </a:rPr>
-              <a:t>Database Implementation</a:t>
-            </a:r>
-          </a:p>
-        </p:txBody>
-      </p:sp>
-      <p:sp>
-        <p:nvSpPr>
-          <p:cNvPr id="16" name="TextBox 16"/>
-          <p:cNvSpPr txBox="1"/>
-          <p:nvPr/>
-        </p:nvSpPr>
-        <p:spPr>
-          <a:xfrm>
-            <a:off x="13339459" y="7506505"/>
-            <a:ext cx="3318539" cy="1043304"/>
-          </a:xfrm>
-          <a:prstGeom prst="rect">
-            <a:avLst/>
-          </a:prstGeom>
-        </p:spPr>
-        <p:txBody>
-          <a:bodyPr lIns="0" tIns="0" rIns="0" bIns="0" rtlCol="0" anchor="t">
-            <a:spAutoFit/>
-          </a:bodyPr>
-          <a:lstStyle/>
-          <a:p>
-            <a:pPr marL="0" lvl="0" indent="0" algn="ctr">
-              <a:lnSpc>
-                <a:spcPts val="3920"/>
-              </a:lnSpc>
-              <a:spcBef>
-                <a:spcPct val="0"/>
-              </a:spcBef>
-            </a:pPr>
-            <a:r>
-              <a:rPr lang="en-US" sz="2800">
-                <a:solidFill>
-                  <a:srgbClr val="2B2B2B"/>
-                </a:solidFill>
-                <a:latin typeface="Agrandir"/>
-                <a:ea typeface="Agrandir"/>
-                <a:cs typeface="Agrandir"/>
-                <a:sym typeface="Agrandir"/>
-              </a:rPr>
-              <a:t>Data Entry and Initial Testing</a:t>
-            </a:r>
-          </a:p>
-        </p:txBody>
-      </p:sp>
-    </p:spTree>
-  </p:cSld>
-  <p:clrMapOvr>
-    <a:masterClrMapping/>
-  </p:clrMapOvr>
-  <p:transition spd="slow">
-    <p:push/>
-  </p:transition>
-</p:sld>
-</file>
-
-<file path=ppt/slides/slide3.xml><?xml version="1.0" encoding="utf-8"?>
-<p:sld xmlns:a="http://schemas.openxmlformats.org/drawingml/2006/main" xmlns:r="http://schemas.openxmlformats.org/officeDocument/2006/relationships" xmlns:p="http://schemas.openxmlformats.org/presentationml/2006/main">
-  <p:cSld>
-    <p:bg>
-      <p:bgPr>
-        <a:solidFill>
           <a:srgbClr val="F6E4E3"/>
         </a:solidFill>
         <a:effectLst/>
@@ -4594,6 +3877,723 @@
           </p:txBody>
         </p:sp>
       </p:grpSp>
+    </p:spTree>
+  </p:cSld>
+  <p:clrMapOvr>
+    <a:masterClrMapping/>
+  </p:clrMapOvr>
+  <p:transition spd="slow">
+    <p:push/>
+  </p:transition>
+</p:sld>
+</file>
+
+<file path=ppt/slides/slide3.xml><?xml version="1.0" encoding="utf-8"?>
+<p:sld xmlns:a="http://schemas.openxmlformats.org/drawingml/2006/main" xmlns:r="http://schemas.openxmlformats.org/officeDocument/2006/relationships" xmlns:p="http://schemas.openxmlformats.org/presentationml/2006/main">
+  <p:cSld>
+    <p:bg>
+      <p:bgPr>
+        <a:solidFill>
+          <a:srgbClr val="FFFCF7"/>
+        </a:solidFill>
+        <a:effectLst/>
+      </p:bgPr>
+    </p:bg>
+    <p:spTree>
+      <p:nvGrpSpPr>
+        <p:cNvPr id="1" name=""/>
+        <p:cNvGrpSpPr/>
+        <p:nvPr/>
+      </p:nvGrpSpPr>
+      <p:grpSpPr>
+        <a:xfrm>
+          <a:off x="0" y="0"/>
+          <a:ext cx="0" cy="0"/>
+          <a:chOff x="0" y="0"/>
+          <a:chExt cx="0" cy="0"/>
+        </a:xfrm>
+      </p:grpSpPr>
+      <p:sp>
+        <p:nvSpPr>
+          <p:cNvPr id="2" name="Freeform 2"/>
+          <p:cNvSpPr/>
+          <p:nvPr/>
+        </p:nvSpPr>
+        <p:spPr>
+          <a:xfrm>
+            <a:off x="9465034" y="878304"/>
+            <a:ext cx="1797669" cy="1851531"/>
+          </a:xfrm>
+          <a:custGeom>
+            <a:avLst/>
+            <a:gdLst/>
+            <a:ahLst/>
+            <a:cxnLst/>
+            <a:rect l="l" t="t" r="r" b="b"/>
+            <a:pathLst>
+              <a:path w="1797669" h="1851531">
+                <a:moveTo>
+                  <a:pt x="0" y="0"/>
+                </a:moveTo>
+                <a:lnTo>
+                  <a:pt x="1797669" y="0"/>
+                </a:lnTo>
+                <a:lnTo>
+                  <a:pt x="1797669" y="1851531"/>
+                </a:lnTo>
+                <a:lnTo>
+                  <a:pt x="0" y="1851531"/>
+                </a:lnTo>
+                <a:lnTo>
+                  <a:pt x="0" y="0"/>
+                </a:lnTo>
+                <a:close/>
+              </a:path>
+            </a:pathLst>
+          </a:custGeom>
+          <a:blipFill>
+            <a:blip r:embed="rId2">
+              <a:extLst>
+                <a:ext uri="{96DAC541-7B7A-43D3-8B79-37D633B846F1}">
+                  <asvg:svgBlip xmlns:asvg="http://schemas.microsoft.com/office/drawing/2016/SVG/main" r:embed="rId3"/>
+                </a:ext>
+              </a:extLst>
+            </a:blip>
+            <a:stretch>
+              <a:fillRect/>
+            </a:stretch>
+          </a:blipFill>
+        </p:spPr>
+      </p:sp>
+      <p:sp>
+        <p:nvSpPr>
+          <p:cNvPr id="3" name="Freeform 3"/>
+          <p:cNvSpPr/>
+          <p:nvPr/>
+        </p:nvSpPr>
+        <p:spPr>
+          <a:xfrm>
+            <a:off x="9401760" y="5288968"/>
+            <a:ext cx="1924218" cy="1798269"/>
+          </a:xfrm>
+          <a:custGeom>
+            <a:avLst/>
+            <a:gdLst/>
+            <a:ahLst/>
+            <a:cxnLst/>
+            <a:rect l="l" t="t" r="r" b="b"/>
+            <a:pathLst>
+              <a:path w="1924218" h="1798269">
+                <a:moveTo>
+                  <a:pt x="0" y="0"/>
+                </a:moveTo>
+                <a:lnTo>
+                  <a:pt x="1924218" y="0"/>
+                </a:lnTo>
+                <a:lnTo>
+                  <a:pt x="1924218" y="1798269"/>
+                </a:lnTo>
+                <a:lnTo>
+                  <a:pt x="0" y="1798269"/>
+                </a:lnTo>
+                <a:lnTo>
+                  <a:pt x="0" y="0"/>
+                </a:lnTo>
+                <a:close/>
+              </a:path>
+            </a:pathLst>
+          </a:custGeom>
+          <a:blipFill>
+            <a:blip r:embed="rId4">
+              <a:extLst>
+                <a:ext uri="{96DAC541-7B7A-43D3-8B79-37D633B846F1}">
+                  <asvg:svgBlip xmlns:asvg="http://schemas.microsoft.com/office/drawing/2016/SVG/main" r:embed="rId5"/>
+                </a:ext>
+              </a:extLst>
+            </a:blip>
+            <a:stretch>
+              <a:fillRect/>
+            </a:stretch>
+          </a:blipFill>
+        </p:spPr>
+      </p:sp>
+      <p:sp>
+        <p:nvSpPr>
+          <p:cNvPr id="4" name="Freeform 4"/>
+          <p:cNvSpPr/>
+          <p:nvPr/>
+        </p:nvSpPr>
+        <p:spPr>
+          <a:xfrm>
+            <a:off x="9959926" y="5862185"/>
+            <a:ext cx="807886" cy="656591"/>
+          </a:xfrm>
+          <a:custGeom>
+            <a:avLst/>
+            <a:gdLst/>
+            <a:ahLst/>
+            <a:cxnLst/>
+            <a:rect l="l" t="t" r="r" b="b"/>
+            <a:pathLst>
+              <a:path w="807886" h="656591">
+                <a:moveTo>
+                  <a:pt x="0" y="0"/>
+                </a:moveTo>
+                <a:lnTo>
+                  <a:pt x="807886" y="0"/>
+                </a:lnTo>
+                <a:lnTo>
+                  <a:pt x="807886" y="656590"/>
+                </a:lnTo>
+                <a:lnTo>
+                  <a:pt x="0" y="656590"/>
+                </a:lnTo>
+                <a:lnTo>
+                  <a:pt x="0" y="0"/>
+                </a:lnTo>
+                <a:close/>
+              </a:path>
+            </a:pathLst>
+          </a:custGeom>
+          <a:blipFill>
+            <a:blip r:embed="rId6">
+              <a:extLst>
+                <a:ext uri="{96DAC541-7B7A-43D3-8B79-37D633B846F1}">
+                  <asvg:svgBlip xmlns:asvg="http://schemas.microsoft.com/office/drawing/2016/SVG/main" r:embed="rId7"/>
+                </a:ext>
+              </a:extLst>
+            </a:blip>
+            <a:stretch>
+              <a:fillRect/>
+            </a:stretch>
+          </a:blipFill>
+        </p:spPr>
+      </p:sp>
+      <p:sp>
+        <p:nvSpPr>
+          <p:cNvPr id="5" name="Freeform 5"/>
+          <p:cNvSpPr/>
+          <p:nvPr/>
+        </p:nvSpPr>
+        <p:spPr>
+          <a:xfrm>
+            <a:off x="10106465" y="1522907"/>
+            <a:ext cx="661347" cy="661347"/>
+          </a:xfrm>
+          <a:custGeom>
+            <a:avLst/>
+            <a:gdLst/>
+            <a:ahLst/>
+            <a:cxnLst/>
+            <a:rect l="l" t="t" r="r" b="b"/>
+            <a:pathLst>
+              <a:path w="661347" h="661347">
+                <a:moveTo>
+                  <a:pt x="0" y="0"/>
+                </a:moveTo>
+                <a:lnTo>
+                  <a:pt x="661347" y="0"/>
+                </a:lnTo>
+                <a:lnTo>
+                  <a:pt x="661347" y="661346"/>
+                </a:lnTo>
+                <a:lnTo>
+                  <a:pt x="0" y="661346"/>
+                </a:lnTo>
+                <a:lnTo>
+                  <a:pt x="0" y="0"/>
+                </a:lnTo>
+                <a:close/>
+              </a:path>
+            </a:pathLst>
+          </a:custGeom>
+          <a:blipFill>
+            <a:blip r:embed="rId8">
+              <a:extLst>
+                <a:ext uri="{96DAC541-7B7A-43D3-8B79-37D633B846F1}">
+                  <asvg:svgBlip xmlns:asvg="http://schemas.microsoft.com/office/drawing/2016/SVG/main" r:embed="rId9"/>
+                </a:ext>
+              </a:extLst>
+            </a:blip>
+            <a:stretch>
+              <a:fillRect/>
+            </a:stretch>
+          </a:blipFill>
+        </p:spPr>
+      </p:sp>
+      <p:sp>
+        <p:nvSpPr>
+          <p:cNvPr id="6" name="Freeform 6"/>
+          <p:cNvSpPr/>
+          <p:nvPr/>
+        </p:nvSpPr>
+        <p:spPr>
+          <a:xfrm>
+            <a:off x="14036620" y="931567"/>
+            <a:ext cx="1924218" cy="1798269"/>
+          </a:xfrm>
+          <a:custGeom>
+            <a:avLst/>
+            <a:gdLst/>
+            <a:ahLst/>
+            <a:cxnLst/>
+            <a:rect l="l" t="t" r="r" b="b"/>
+            <a:pathLst>
+              <a:path w="1924218" h="1798269">
+                <a:moveTo>
+                  <a:pt x="0" y="0"/>
+                </a:moveTo>
+                <a:lnTo>
+                  <a:pt x="1924217" y="0"/>
+                </a:lnTo>
+                <a:lnTo>
+                  <a:pt x="1924217" y="1798268"/>
+                </a:lnTo>
+                <a:lnTo>
+                  <a:pt x="0" y="1798268"/>
+                </a:lnTo>
+                <a:lnTo>
+                  <a:pt x="0" y="0"/>
+                </a:lnTo>
+                <a:close/>
+              </a:path>
+            </a:pathLst>
+          </a:custGeom>
+          <a:blipFill>
+            <a:blip r:embed="rId10">
+              <a:extLst>
+                <a:ext uri="{96DAC541-7B7A-43D3-8B79-37D633B846F1}">
+                  <asvg:svgBlip xmlns:asvg="http://schemas.microsoft.com/office/drawing/2016/SVG/main" r:embed="rId11"/>
+                </a:ext>
+              </a:extLst>
+            </a:blip>
+            <a:stretch>
+              <a:fillRect/>
+            </a:stretch>
+          </a:blipFill>
+        </p:spPr>
+      </p:sp>
+      <p:sp>
+        <p:nvSpPr>
+          <p:cNvPr id="7" name="Freeform 7"/>
+          <p:cNvSpPr/>
+          <p:nvPr/>
+        </p:nvSpPr>
+        <p:spPr>
+          <a:xfrm>
+            <a:off x="14740868" y="1522907"/>
+            <a:ext cx="515722" cy="656591"/>
+          </a:xfrm>
+          <a:custGeom>
+            <a:avLst/>
+            <a:gdLst/>
+            <a:ahLst/>
+            <a:cxnLst/>
+            <a:rect l="l" t="t" r="r" b="b"/>
+            <a:pathLst>
+              <a:path w="515722" h="656591">
+                <a:moveTo>
+                  <a:pt x="0" y="0"/>
+                </a:moveTo>
+                <a:lnTo>
+                  <a:pt x="515722" y="0"/>
+                </a:lnTo>
+                <a:lnTo>
+                  <a:pt x="515722" y="656590"/>
+                </a:lnTo>
+                <a:lnTo>
+                  <a:pt x="0" y="656590"/>
+                </a:lnTo>
+                <a:lnTo>
+                  <a:pt x="0" y="0"/>
+                </a:lnTo>
+                <a:close/>
+              </a:path>
+            </a:pathLst>
+          </a:custGeom>
+          <a:blipFill>
+            <a:blip r:embed="rId12">
+              <a:extLst>
+                <a:ext uri="{96DAC541-7B7A-43D3-8B79-37D633B846F1}">
+                  <asvg:svgBlip xmlns:asvg="http://schemas.microsoft.com/office/drawing/2016/SVG/main" r:embed="rId13"/>
+                </a:ext>
+              </a:extLst>
+            </a:blip>
+            <a:stretch>
+              <a:fillRect/>
+            </a:stretch>
+          </a:blipFill>
+        </p:spPr>
+      </p:sp>
+      <p:sp>
+        <p:nvSpPr>
+          <p:cNvPr id="8" name="Freeform 8"/>
+          <p:cNvSpPr/>
+          <p:nvPr/>
+        </p:nvSpPr>
+        <p:spPr>
+          <a:xfrm>
+            <a:off x="14099894" y="5235705"/>
+            <a:ext cx="1797669" cy="1851531"/>
+          </a:xfrm>
+          <a:custGeom>
+            <a:avLst/>
+            <a:gdLst/>
+            <a:ahLst/>
+            <a:cxnLst/>
+            <a:rect l="l" t="t" r="r" b="b"/>
+            <a:pathLst>
+              <a:path w="1797669" h="1851531">
+                <a:moveTo>
+                  <a:pt x="0" y="0"/>
+                </a:moveTo>
+                <a:lnTo>
+                  <a:pt x="1797669" y="0"/>
+                </a:lnTo>
+                <a:lnTo>
+                  <a:pt x="1797669" y="1851532"/>
+                </a:lnTo>
+                <a:lnTo>
+                  <a:pt x="0" y="1851532"/>
+                </a:lnTo>
+                <a:lnTo>
+                  <a:pt x="0" y="0"/>
+                </a:lnTo>
+                <a:close/>
+              </a:path>
+            </a:pathLst>
+          </a:custGeom>
+          <a:blipFill>
+            <a:blip r:embed="rId14">
+              <a:extLst>
+                <a:ext uri="{96DAC541-7B7A-43D3-8B79-37D633B846F1}">
+                  <asvg:svgBlip xmlns:asvg="http://schemas.microsoft.com/office/drawing/2016/SVG/main" r:embed="rId15"/>
+                </a:ext>
+              </a:extLst>
+            </a:blip>
+            <a:stretch>
+              <a:fillRect/>
+            </a:stretch>
+          </a:blipFill>
+        </p:spPr>
+      </p:sp>
+      <p:sp>
+        <p:nvSpPr>
+          <p:cNvPr id="9" name="Freeform 9"/>
+          <p:cNvSpPr/>
+          <p:nvPr/>
+        </p:nvSpPr>
+        <p:spPr>
+          <a:xfrm>
+            <a:off x="14624236" y="5651378"/>
+            <a:ext cx="748986" cy="1020185"/>
+          </a:xfrm>
+          <a:custGeom>
+            <a:avLst/>
+            <a:gdLst/>
+            <a:ahLst/>
+            <a:cxnLst/>
+            <a:rect l="l" t="t" r="r" b="b"/>
+            <a:pathLst>
+              <a:path w="748986" h="1020185">
+                <a:moveTo>
+                  <a:pt x="0" y="0"/>
+                </a:moveTo>
+                <a:lnTo>
+                  <a:pt x="748986" y="0"/>
+                </a:lnTo>
+                <a:lnTo>
+                  <a:pt x="748986" y="1020185"/>
+                </a:lnTo>
+                <a:lnTo>
+                  <a:pt x="0" y="1020185"/>
+                </a:lnTo>
+                <a:lnTo>
+                  <a:pt x="0" y="0"/>
+                </a:lnTo>
+                <a:close/>
+              </a:path>
+            </a:pathLst>
+          </a:custGeom>
+          <a:blipFill>
+            <a:blip r:embed="rId16">
+              <a:extLst>
+                <a:ext uri="{96DAC541-7B7A-43D3-8B79-37D633B846F1}">
+                  <asvg:svgBlip xmlns:asvg="http://schemas.microsoft.com/office/drawing/2016/SVG/main" r:embed="rId17"/>
+                </a:ext>
+              </a:extLst>
+            </a:blip>
+            <a:stretch>
+              <a:fillRect/>
+            </a:stretch>
+          </a:blipFill>
+        </p:spPr>
+      </p:sp>
+      <p:sp>
+        <p:nvSpPr>
+          <p:cNvPr id="10" name="TextBox 10"/>
+          <p:cNvSpPr txBox="1"/>
+          <p:nvPr/>
+        </p:nvSpPr>
+        <p:spPr>
+          <a:xfrm>
+            <a:off x="1403053" y="3883052"/>
+            <a:ext cx="5501342" cy="2305050"/>
+          </a:xfrm>
+          <a:prstGeom prst="rect">
+            <a:avLst/>
+          </a:prstGeom>
+        </p:spPr>
+        <p:txBody>
+          <a:bodyPr lIns="0" tIns="0" rIns="0" bIns="0" rtlCol="0" anchor="t">
+            <a:spAutoFit/>
+          </a:bodyPr>
+          <a:lstStyle/>
+          <a:p>
+            <a:pPr marL="0" lvl="0" indent="0" algn="ctr">
+              <a:lnSpc>
+                <a:spcPts val="8399"/>
+              </a:lnSpc>
+              <a:spcBef>
+                <a:spcPct val="0"/>
+              </a:spcBef>
+            </a:pPr>
+            <a:r>
+              <a:rPr lang="en-US" sz="6999">
+                <a:solidFill>
+                  <a:srgbClr val="2B2B2B"/>
+                </a:solidFill>
+                <a:latin typeface="Agrandir"/>
+                <a:ea typeface="Agrandir"/>
+                <a:cs typeface="Agrandir"/>
+                <a:sym typeface="Agrandir"/>
+              </a:rPr>
+              <a:t>Stages of creation</a:t>
+            </a:r>
+          </a:p>
+        </p:txBody>
+      </p:sp>
+      <p:sp>
+        <p:nvSpPr>
+          <p:cNvPr id="11" name="TextBox 11"/>
+          <p:cNvSpPr txBox="1"/>
+          <p:nvPr/>
+        </p:nvSpPr>
+        <p:spPr>
+          <a:xfrm>
+            <a:off x="8704599" y="3122472"/>
+            <a:ext cx="3318539" cy="1043304"/>
+          </a:xfrm>
+          <a:prstGeom prst="rect">
+            <a:avLst/>
+          </a:prstGeom>
+        </p:spPr>
+        <p:txBody>
+          <a:bodyPr lIns="0" tIns="0" rIns="0" bIns="0" rtlCol="0" anchor="t">
+            <a:spAutoFit/>
+          </a:bodyPr>
+          <a:lstStyle/>
+          <a:p>
+            <a:pPr marL="0" lvl="0" indent="0" algn="ctr">
+              <a:lnSpc>
+                <a:spcPts val="3920"/>
+              </a:lnSpc>
+              <a:spcBef>
+                <a:spcPct val="0"/>
+              </a:spcBef>
+            </a:pPr>
+            <a:r>
+              <a:rPr lang="en-US" sz="2800">
+                <a:solidFill>
+                  <a:srgbClr val="2B2B2B"/>
+                </a:solidFill>
+                <a:latin typeface="Agrandir"/>
+                <a:ea typeface="Agrandir"/>
+                <a:cs typeface="Agrandir"/>
+                <a:sym typeface="Agrandir"/>
+              </a:rPr>
+              <a:t>Requirement Analysis</a:t>
+            </a:r>
+          </a:p>
+        </p:txBody>
+      </p:sp>
+      <p:grpSp>
+        <p:nvGrpSpPr>
+          <p:cNvPr id="12" name="Group 12"/>
+          <p:cNvGrpSpPr/>
+          <p:nvPr/>
+        </p:nvGrpSpPr>
+        <p:grpSpPr>
+          <a:xfrm>
+            <a:off x="8704599" y="7630330"/>
+            <a:ext cx="3318539" cy="1518069"/>
+            <a:chOff x="0" y="0"/>
+            <a:chExt cx="4424719" cy="2024092"/>
+          </a:xfrm>
+        </p:grpSpPr>
+        <p:sp>
+          <p:nvSpPr>
+            <p:cNvPr id="13" name="TextBox 13"/>
+            <p:cNvSpPr txBox="1"/>
+            <p:nvPr/>
+          </p:nvSpPr>
+          <p:spPr>
+            <a:xfrm>
+              <a:off x="0" y="-123825"/>
+              <a:ext cx="4424719" cy="1349798"/>
+            </a:xfrm>
+            <a:prstGeom prst="rect">
+              <a:avLst/>
+            </a:prstGeom>
+          </p:spPr>
+          <p:txBody>
+            <a:bodyPr lIns="0" tIns="0" rIns="0" bIns="0" rtlCol="0" anchor="t">
+              <a:spAutoFit/>
+            </a:bodyPr>
+            <a:lstStyle/>
+            <a:p>
+              <a:pPr marL="0" lvl="0" indent="0" algn="ctr">
+                <a:lnSpc>
+                  <a:spcPts val="3920"/>
+                </a:lnSpc>
+                <a:spcBef>
+                  <a:spcPct val="0"/>
+                </a:spcBef>
+              </a:pPr>
+              <a:r>
+                <a:rPr lang="en-US" sz="2800">
+                  <a:solidFill>
+                    <a:srgbClr val="2B2B2B"/>
+                  </a:solidFill>
+                  <a:latin typeface="Agrandir"/>
+                  <a:ea typeface="Agrandir"/>
+                  <a:cs typeface="Agrandir"/>
+                  <a:sym typeface="Agrandir"/>
+                </a:rPr>
+                <a:t>Designing the Structure</a:t>
+              </a:r>
+            </a:p>
+          </p:txBody>
+        </p:sp>
+        <p:sp>
+          <p:nvSpPr>
+            <p:cNvPr id="14" name="TextBox 14"/>
+            <p:cNvSpPr txBox="1"/>
+            <p:nvPr/>
+          </p:nvSpPr>
+          <p:spPr>
+            <a:xfrm>
+              <a:off x="0" y="1473125"/>
+              <a:ext cx="4424719" cy="550968"/>
+            </a:xfrm>
+            <a:prstGeom prst="rect">
+              <a:avLst/>
+            </a:prstGeom>
+          </p:spPr>
+          <p:txBody>
+            <a:bodyPr lIns="0" tIns="0" rIns="0" bIns="0" rtlCol="0" anchor="t">
+              <a:spAutoFit/>
+            </a:bodyPr>
+            <a:lstStyle/>
+            <a:p>
+              <a:pPr marL="0" lvl="0" indent="0" algn="ctr">
+                <a:lnSpc>
+                  <a:spcPts val="3080"/>
+                </a:lnSpc>
+              </a:pPr>
+              <a:endParaRPr/>
+            </a:p>
+          </p:txBody>
+        </p:sp>
+      </p:grpSp>
+      <p:sp>
+        <p:nvSpPr>
+          <p:cNvPr id="15" name="TextBox 15"/>
+          <p:cNvSpPr txBox="1"/>
+          <p:nvPr/>
+        </p:nvSpPr>
+        <p:spPr>
+          <a:xfrm>
+            <a:off x="13339459" y="3122472"/>
+            <a:ext cx="3318539" cy="1043304"/>
+          </a:xfrm>
+          <a:prstGeom prst="rect">
+            <a:avLst/>
+          </a:prstGeom>
+        </p:spPr>
+        <p:txBody>
+          <a:bodyPr lIns="0" tIns="0" rIns="0" bIns="0" rtlCol="0" anchor="t">
+            <a:spAutoFit/>
+          </a:bodyPr>
+          <a:lstStyle/>
+          <a:p>
+            <a:pPr marL="0" lvl="0" indent="0" algn="ctr">
+              <a:lnSpc>
+                <a:spcPts val="3920"/>
+              </a:lnSpc>
+              <a:spcBef>
+                <a:spcPct val="0"/>
+              </a:spcBef>
+            </a:pPr>
+            <a:r>
+              <a:rPr lang="en-US" sz="2800">
+                <a:solidFill>
+                  <a:srgbClr val="2B2B2B"/>
+                </a:solidFill>
+                <a:latin typeface="Agrandir"/>
+                <a:ea typeface="Agrandir"/>
+                <a:cs typeface="Agrandir"/>
+                <a:sym typeface="Agrandir"/>
+              </a:rPr>
+              <a:t>Database Implementation</a:t>
+            </a:r>
+          </a:p>
+        </p:txBody>
+      </p:sp>
+      <p:sp>
+        <p:nvSpPr>
+          <p:cNvPr id="16" name="TextBox 16"/>
+          <p:cNvSpPr txBox="1"/>
+          <p:nvPr/>
+        </p:nvSpPr>
+        <p:spPr>
+          <a:xfrm>
+            <a:off x="13339459" y="7506505"/>
+            <a:ext cx="3318539" cy="1043304"/>
+          </a:xfrm>
+          <a:prstGeom prst="rect">
+            <a:avLst/>
+          </a:prstGeom>
+        </p:spPr>
+        <p:txBody>
+          <a:bodyPr lIns="0" tIns="0" rIns="0" bIns="0" rtlCol="0" anchor="t">
+            <a:spAutoFit/>
+          </a:bodyPr>
+          <a:lstStyle/>
+          <a:p>
+            <a:pPr marL="0" lvl="0" indent="0" algn="ctr">
+              <a:lnSpc>
+                <a:spcPts val="3920"/>
+              </a:lnSpc>
+              <a:spcBef>
+                <a:spcPct val="0"/>
+              </a:spcBef>
+            </a:pPr>
+            <a:r>
+              <a:rPr lang="en-US" sz="2800">
+                <a:solidFill>
+                  <a:srgbClr val="2B2B2B"/>
+                </a:solidFill>
+                <a:latin typeface="Agrandir"/>
+                <a:ea typeface="Agrandir"/>
+                <a:cs typeface="Agrandir"/>
+                <a:sym typeface="Agrandir"/>
+              </a:rPr>
+              <a:t>Data Entry and Initial Testing</a:t>
+            </a:r>
+          </a:p>
+        </p:txBody>
+      </p:sp>
     </p:spTree>
   </p:cSld>
   <p:clrMapOvr>

</xml_diff>